<commit_message>
Bug sliden no longer relevant because fixed
</commit_message>
<xml_diff>
--- a/Phase 2/Slides.pptx
+++ b/Phase 2/Slides.pptx
@@ -5,7 +5,7 @@
     <p:sldMasterId id="2147483658" r:id="rId1"/>
   </p:sldMasterIdLst>
   <p:notesMasterIdLst>
-    <p:notesMasterId r:id="rId12"/>
+    <p:notesMasterId r:id="rId11"/>
   </p:notesMasterIdLst>
   <p:sldIdLst>
     <p:sldId id="256" r:id="rId2"/>
@@ -14,25 +14,24 @@
     <p:sldId id="259" r:id="rId5"/>
     <p:sldId id="260" r:id="rId6"/>
     <p:sldId id="261" r:id="rId7"/>
-    <p:sldId id="262" r:id="rId8"/>
-    <p:sldId id="263" r:id="rId9"/>
-    <p:sldId id="264" r:id="rId10"/>
-    <p:sldId id="265" r:id="rId11"/>
+    <p:sldId id="263" r:id="rId8"/>
+    <p:sldId id="264" r:id="rId9"/>
+    <p:sldId id="265" r:id="rId10"/>
   </p:sldIdLst>
   <p:sldSz cx="9144000" cy="6858000" type="screen4x3"/>
   <p:notesSz cx="6858000" cy="9144000"/>
   <p:embeddedFontLst>
     <p:embeddedFont>
       <p:font typeface="Roboto Slab" pitchFamily="2" charset="0"/>
-      <p:regular r:id="rId13"/>
-      <p:bold r:id="rId14"/>
+      <p:regular r:id="rId12"/>
+      <p:bold r:id="rId13"/>
     </p:embeddedFont>
     <p:embeddedFont>
       <p:font typeface="Source Sans Pro" charset="0"/>
-      <p:regular r:id="rId15"/>
-      <p:bold r:id="rId16"/>
-      <p:italic r:id="rId17"/>
-      <p:boldItalic r:id="rId18"/>
+      <p:regular r:id="rId14"/>
+      <p:bold r:id="rId15"/>
+      <p:italic r:id="rId16"/>
+      <p:boldItalic r:id="rId17"/>
     </p:embeddedFont>
   </p:embeddedFontLst>
   <p:defaultTextStyle>
@@ -814,114 +813,6 @@
 </p:notes>
 </file>
 
-<file path=ppt/notesSlides/notesSlide10.xml><?xml version="1.0" encoding="utf-8"?>
-<p:notes xmlns:a="http://schemas.openxmlformats.org/drawingml/2006/main" xmlns:r="http://schemas.openxmlformats.org/officeDocument/2006/relationships" xmlns:p="http://schemas.openxmlformats.org/presentationml/2006/main" showMasterSp="0" showMasterPhAnim="0">
-  <p:cSld>
-    <p:spTree>
-      <p:nvGrpSpPr>
-        <p:cNvPr id="1" name="Shape 135"/>
-        <p:cNvGrpSpPr/>
-        <p:nvPr/>
-      </p:nvGrpSpPr>
-      <p:grpSpPr>
-        <a:xfrm>
-          <a:off x="0" y="0"/>
-          <a:ext cx="0" cy="0"/>
-          <a:chOff x="0" y="0"/>
-          <a:chExt cx="0" cy="0"/>
-        </a:xfrm>
-      </p:grpSpPr>
-      <p:sp>
-        <p:nvSpPr>
-          <p:cNvPr id="136" name="Shape 136"/>
-          <p:cNvSpPr>
-            <a:spLocks noGrp="1" noRot="1" noChangeAspect="1"/>
-          </p:cNvSpPr>
-          <p:nvPr>
-            <p:ph type="sldImg" idx="2"/>
-          </p:nvPr>
-        </p:nvSpPr>
-        <p:spPr>
-          <a:xfrm>
-            <a:off x="1143225" y="685800"/>
-            <a:ext cx="4572300" cy="3429000"/>
-          </a:xfrm>
-          <a:custGeom>
-            <a:avLst/>
-            <a:gdLst/>
-            <a:ahLst/>
-            <a:cxnLst/>
-            <a:rect l="0" t="0" r="0" b="0"/>
-            <a:pathLst>
-              <a:path w="120000" h="120000" extrusionOk="0">
-                <a:moveTo>
-                  <a:pt x="0" y="0"/>
-                </a:moveTo>
-                <a:lnTo>
-                  <a:pt x="120000" y="0"/>
-                </a:lnTo>
-                <a:lnTo>
-                  <a:pt x="120000" y="120000"/>
-                </a:lnTo>
-                <a:lnTo>
-                  <a:pt x="0" y="120000"/>
-                </a:lnTo>
-                <a:close/>
-              </a:path>
-            </a:pathLst>
-          </a:custGeom>
-        </p:spPr>
-      </p:sp>
-      <p:sp>
-        <p:nvSpPr>
-          <p:cNvPr id="137" name="Shape 137"/>
-          <p:cNvSpPr txBox="1">
-            <a:spLocks noGrp="1"/>
-          </p:cNvSpPr>
-          <p:nvPr>
-            <p:ph type="body" idx="1"/>
-          </p:nvPr>
-        </p:nvSpPr>
-        <p:spPr>
-          <a:xfrm>
-            <a:off x="685800" y="4343400"/>
-            <a:ext cx="5486400" cy="4114800"/>
-          </a:xfrm>
-          <a:prstGeom prst="rect">
-            <a:avLst/>
-          </a:prstGeom>
-        </p:spPr>
-        <p:txBody>
-          <a:bodyPr spcFirstLastPara="1" wrap="square" lIns="91425" tIns="91425" rIns="91425" bIns="91425" anchor="t" anchorCtr="0">
-            <a:noAutofit/>
-          </a:bodyPr>
-          <a:lstStyle/>
-          <a:p>
-            <a:pPr marL="0" lvl="0" indent="0" rtl="0">
-              <a:spcBef>
-                <a:spcPts val="0"/>
-              </a:spcBef>
-              <a:spcAft>
-                <a:spcPts val="0"/>
-              </a:spcAft>
-              <a:buNone/>
-            </a:pPr>
-            <a:r>
-              <a:rPr lang="en"/>
-              <a:t>Merci !</a:t>
-            </a:r>
-            <a:endParaRPr/>
-          </a:p>
-        </p:txBody>
-      </p:sp>
-    </p:spTree>
-  </p:cSld>
-  <p:clrMapOvr>
-    <a:masterClrMapping/>
-  </p:clrMapOvr>
-</p:notes>
-</file>
-
 <file path=ppt/notesSlides/notesSlide2.xml><?xml version="1.0" encoding="utf-8"?>
 <p:notes xmlns:a="http://schemas.openxmlformats.org/drawingml/2006/main" xmlns:r="http://schemas.openxmlformats.org/officeDocument/2006/relationships" xmlns:p="http://schemas.openxmlformats.org/presentationml/2006/main" showMasterSp="0" showMasterPhAnim="0">
   <p:cSld>
@@ -1554,7 +1445,7 @@
   <p:cSld>
     <p:spTree>
       <p:nvGrpSpPr>
-        <p:cNvPr id="1" name="Shape 114"/>
+        <p:cNvPr id="1" name="Shape 121"/>
         <p:cNvGrpSpPr/>
         <p:nvPr/>
       </p:nvGrpSpPr>
@@ -1568,7 +1459,7 @@
       </p:grpSpPr>
       <p:sp>
         <p:nvSpPr>
-          <p:cNvPr id="115" name="Shape 115"/>
+          <p:cNvPr id="122" name="Shape 122"/>
           <p:cNvSpPr>
             <a:spLocks noGrp="1" noRot="1" noChangeAspect="1"/>
           </p:cNvSpPr>
@@ -1578,8 +1469,8 @@
         </p:nvSpPr>
         <p:spPr>
           <a:xfrm>
-            <a:off x="1143225" y="685800"/>
-            <a:ext cx="4572300" cy="3429000"/>
+            <a:off x="1143000" y="685800"/>
+            <a:ext cx="4572000" cy="3429000"/>
           </a:xfrm>
           <a:custGeom>
             <a:avLst/>
@@ -1609,158 +1500,6 @@
       </p:sp>
       <p:sp>
         <p:nvSpPr>
-          <p:cNvPr id="116" name="Shape 116"/>
-          <p:cNvSpPr txBox="1">
-            <a:spLocks noGrp="1"/>
-          </p:cNvSpPr>
-          <p:nvPr>
-            <p:ph type="body" idx="1"/>
-          </p:nvPr>
-        </p:nvSpPr>
-        <p:spPr>
-          <a:xfrm>
-            <a:off x="685800" y="4343400"/>
-            <a:ext cx="5486400" cy="4114800"/>
-          </a:xfrm>
-          <a:prstGeom prst="rect">
-            <a:avLst/>
-          </a:prstGeom>
-        </p:spPr>
-        <p:txBody>
-          <a:bodyPr spcFirstLastPara="1" wrap="square" lIns="91425" tIns="91425" rIns="91425" bIns="91425" anchor="t" anchorCtr="0">
-            <a:noAutofit/>
-          </a:bodyPr>
-          <a:lstStyle/>
-          <a:p>
-            <a:pPr marL="0" lvl="0" indent="0">
-              <a:spcBef>
-                <a:spcPts val="0"/>
-              </a:spcBef>
-              <a:spcAft>
-                <a:spcPts val="0"/>
-              </a:spcAft>
-              <a:buNone/>
-            </a:pPr>
-            <a:r>
-              <a:rPr lang="en" dirty="0"/>
-              <a:t>Un problème rencontré dans l’émulateur Android, c’est qu’à partir de 40 matchs, le fichier JSON obtenus lors de la requête GET atteint sa limite. On n’est pas sûrs encore si ça vient du fait que la console d’Android Studio ne montre pas tous les caractères, ou si cela vient de la limite maximum imposée par MatchMore.</a:t>
-            </a:r>
-            <a:endParaRPr dirty="0"/>
-          </a:p>
-          <a:p>
-            <a:pPr marL="0" lvl="0" indent="0">
-              <a:spcBef>
-                <a:spcPts val="0"/>
-              </a:spcBef>
-              <a:spcAft>
-                <a:spcPts val="0"/>
-              </a:spcAft>
-              <a:buNone/>
-            </a:pPr>
-            <a:endParaRPr dirty="0"/>
-          </a:p>
-          <a:p>
-            <a:pPr marL="0" lvl="0" indent="0" rtl="0">
-              <a:spcBef>
-                <a:spcPts val="0"/>
-              </a:spcBef>
-              <a:spcAft>
-                <a:spcPts val="0"/>
-              </a:spcAft>
-              <a:buNone/>
-            </a:pPr>
-            <a:r>
-              <a:rPr lang="en" dirty="0"/>
-              <a:t>Un autre problème, mais cette fois dans la version APK-release, c’est que lorsqu’on lance l’app pour la première fois, l’application va mettre du temps pour se configurer et donc de trouver un </a:t>
-            </a:r>
-            <a:r>
-              <a:rPr lang="en"/>
-              <a:t>match</a:t>
-            </a:r>
-            <a:r>
-              <a:rPr lang="en" smtClean="0"/>
-              <a:t>. </a:t>
-            </a:r>
-            <a:r>
-              <a:rPr lang="en" dirty="0" smtClean="0"/>
-              <a:t>La </a:t>
-            </a:r>
-            <a:r>
-              <a:rPr lang="en" dirty="0"/>
-              <a:t>localisation du premier match (publication et souscription créées par le même device) va se faire en (0;0), sûrement à cause du temps de configuration. Les prochaines utilisation de l’app et les prochains matches n’ont pas de problèmes.</a:t>
-            </a:r>
-            <a:endParaRPr dirty="0"/>
-          </a:p>
-        </p:txBody>
-      </p:sp>
-    </p:spTree>
-  </p:cSld>
-  <p:clrMapOvr>
-    <a:masterClrMapping/>
-  </p:clrMapOvr>
-</p:notes>
-</file>
-
-<file path=ppt/notesSlides/notesSlide8.xml><?xml version="1.0" encoding="utf-8"?>
-<p:notes xmlns:a="http://schemas.openxmlformats.org/drawingml/2006/main" xmlns:r="http://schemas.openxmlformats.org/officeDocument/2006/relationships" xmlns:p="http://schemas.openxmlformats.org/presentationml/2006/main" showMasterSp="0" showMasterPhAnim="0">
-  <p:cSld>
-    <p:spTree>
-      <p:nvGrpSpPr>
-        <p:cNvPr id="1" name="Shape 121"/>
-        <p:cNvGrpSpPr/>
-        <p:nvPr/>
-      </p:nvGrpSpPr>
-      <p:grpSpPr>
-        <a:xfrm>
-          <a:off x="0" y="0"/>
-          <a:ext cx="0" cy="0"/>
-          <a:chOff x="0" y="0"/>
-          <a:chExt cx="0" cy="0"/>
-        </a:xfrm>
-      </p:grpSpPr>
-      <p:sp>
-        <p:nvSpPr>
-          <p:cNvPr id="122" name="Shape 122"/>
-          <p:cNvSpPr>
-            <a:spLocks noGrp="1" noRot="1" noChangeAspect="1"/>
-          </p:cNvSpPr>
-          <p:nvPr>
-            <p:ph type="sldImg" idx="2"/>
-          </p:nvPr>
-        </p:nvSpPr>
-        <p:spPr>
-          <a:xfrm>
-            <a:off x="1143225" y="685800"/>
-            <a:ext cx="4572300" cy="3429000"/>
-          </a:xfrm>
-          <a:custGeom>
-            <a:avLst/>
-            <a:gdLst/>
-            <a:ahLst/>
-            <a:cxnLst/>
-            <a:rect l="0" t="0" r="0" b="0"/>
-            <a:pathLst>
-              <a:path w="120000" h="120000" extrusionOk="0">
-                <a:moveTo>
-                  <a:pt x="0" y="0"/>
-                </a:moveTo>
-                <a:lnTo>
-                  <a:pt x="120000" y="0"/>
-                </a:lnTo>
-                <a:lnTo>
-                  <a:pt x="120000" y="120000"/>
-                </a:lnTo>
-                <a:lnTo>
-                  <a:pt x="0" y="120000"/>
-                </a:lnTo>
-                <a:close/>
-              </a:path>
-            </a:pathLst>
-          </a:custGeom>
-        </p:spPr>
-      </p:sp>
-      <p:sp>
-        <p:nvSpPr>
           <p:cNvPr id="123" name="Shape 123"/>
           <p:cNvSpPr txBox="1">
             <a:spLocks noGrp="1"/>
@@ -1809,7 +1548,7 @@
 </p:notes>
 </file>
 
-<file path=ppt/notesSlides/notesSlide9.xml><?xml version="1.0" encoding="utf-8"?>
+<file path=ppt/notesSlides/notesSlide8.xml><?xml version="1.0" encoding="utf-8"?>
 <p:notes xmlns:a="http://schemas.openxmlformats.org/drawingml/2006/main" xmlns:r="http://schemas.openxmlformats.org/officeDocument/2006/relationships" xmlns:p="http://schemas.openxmlformats.org/presentationml/2006/main" showMasterSp="0" showMasterPhAnim="0">
   <p:cSld>
     <p:spTree>
@@ -1838,8 +1577,8 @@
         </p:nvSpPr>
         <p:spPr>
           <a:xfrm>
-            <a:off x="1143225" y="685800"/>
-            <a:ext cx="4572300" cy="3429000"/>
+            <a:off x="1143000" y="685800"/>
+            <a:ext cx="4572000" cy="3429000"/>
           </a:xfrm>
           <a:custGeom>
             <a:avLst/>
@@ -1904,6 +1643,114 @@
             <a:r>
               <a:rPr lang="en"/>
               <a:t>Le travail qu’il nous reste à faire, c’est d’implémenter le backend. Optionnellement, implémenter l’upload d’une image lors d’une publication (sauf si trop dur à faire).</a:t>
+            </a:r>
+            <a:endParaRPr/>
+          </a:p>
+        </p:txBody>
+      </p:sp>
+    </p:spTree>
+  </p:cSld>
+  <p:clrMapOvr>
+    <a:masterClrMapping/>
+  </p:clrMapOvr>
+</p:notes>
+</file>
+
+<file path=ppt/notesSlides/notesSlide9.xml><?xml version="1.0" encoding="utf-8"?>
+<p:notes xmlns:a="http://schemas.openxmlformats.org/drawingml/2006/main" xmlns:r="http://schemas.openxmlformats.org/officeDocument/2006/relationships" xmlns:p="http://schemas.openxmlformats.org/presentationml/2006/main" showMasterSp="0" showMasterPhAnim="0">
+  <p:cSld>
+    <p:spTree>
+      <p:nvGrpSpPr>
+        <p:cNvPr id="1" name="Shape 135"/>
+        <p:cNvGrpSpPr/>
+        <p:nvPr/>
+      </p:nvGrpSpPr>
+      <p:grpSpPr>
+        <a:xfrm>
+          <a:off x="0" y="0"/>
+          <a:ext cx="0" cy="0"/>
+          <a:chOff x="0" y="0"/>
+          <a:chExt cx="0" cy="0"/>
+        </a:xfrm>
+      </p:grpSpPr>
+      <p:sp>
+        <p:nvSpPr>
+          <p:cNvPr id="136" name="Shape 136"/>
+          <p:cNvSpPr>
+            <a:spLocks noGrp="1" noRot="1" noChangeAspect="1"/>
+          </p:cNvSpPr>
+          <p:nvPr>
+            <p:ph type="sldImg" idx="2"/>
+          </p:nvPr>
+        </p:nvSpPr>
+        <p:spPr>
+          <a:xfrm>
+            <a:off x="1143000" y="685800"/>
+            <a:ext cx="4572000" cy="3429000"/>
+          </a:xfrm>
+          <a:custGeom>
+            <a:avLst/>
+            <a:gdLst/>
+            <a:ahLst/>
+            <a:cxnLst/>
+            <a:rect l="0" t="0" r="0" b="0"/>
+            <a:pathLst>
+              <a:path w="120000" h="120000" extrusionOk="0">
+                <a:moveTo>
+                  <a:pt x="0" y="0"/>
+                </a:moveTo>
+                <a:lnTo>
+                  <a:pt x="120000" y="0"/>
+                </a:lnTo>
+                <a:lnTo>
+                  <a:pt x="120000" y="120000"/>
+                </a:lnTo>
+                <a:lnTo>
+                  <a:pt x="0" y="120000"/>
+                </a:lnTo>
+                <a:close/>
+              </a:path>
+            </a:pathLst>
+          </a:custGeom>
+        </p:spPr>
+      </p:sp>
+      <p:sp>
+        <p:nvSpPr>
+          <p:cNvPr id="137" name="Shape 137"/>
+          <p:cNvSpPr txBox="1">
+            <a:spLocks noGrp="1"/>
+          </p:cNvSpPr>
+          <p:nvPr>
+            <p:ph type="body" idx="1"/>
+          </p:nvPr>
+        </p:nvSpPr>
+        <p:spPr>
+          <a:xfrm>
+            <a:off x="685800" y="4343400"/>
+            <a:ext cx="5486400" cy="4114800"/>
+          </a:xfrm>
+          <a:prstGeom prst="rect">
+            <a:avLst/>
+          </a:prstGeom>
+        </p:spPr>
+        <p:txBody>
+          <a:bodyPr spcFirstLastPara="1" wrap="square" lIns="91425" tIns="91425" rIns="91425" bIns="91425" anchor="t" anchorCtr="0">
+            <a:noAutofit/>
+          </a:bodyPr>
+          <a:lstStyle/>
+          <a:p>
+            <a:pPr marL="0" lvl="0" indent="0" rtl="0">
+              <a:spcBef>
+                <a:spcPts val="0"/>
+              </a:spcBef>
+              <a:spcAft>
+                <a:spcPts val="0"/>
+              </a:spcAft>
+              <a:buNone/>
+            </a:pPr>
+            <a:r>
+              <a:rPr lang="en"/>
+              <a:t>Merci !</a:t>
             </a:r>
             <a:endParaRPr/>
           </a:p>
@@ -7455,166 +7302,6 @@
 </p:sld>
 </file>
 
-<file path=ppt/slides/slide10.xml><?xml version="1.0" encoding="utf-8"?>
-<p:sld xmlns:a="http://schemas.openxmlformats.org/drawingml/2006/main" xmlns:r="http://schemas.openxmlformats.org/officeDocument/2006/relationships" xmlns:p="http://schemas.openxmlformats.org/presentationml/2006/main">
-  <p:cSld>
-    <p:spTree>
-      <p:nvGrpSpPr>
-        <p:cNvPr id="1" name="Shape 138"/>
-        <p:cNvGrpSpPr/>
-        <p:nvPr/>
-      </p:nvGrpSpPr>
-      <p:grpSpPr>
-        <a:xfrm>
-          <a:off x="0" y="0"/>
-          <a:ext cx="0" cy="0"/>
-          <a:chOff x="0" y="0"/>
-          <a:chExt cx="0" cy="0"/>
-        </a:xfrm>
-      </p:grpSpPr>
-      <p:sp>
-        <p:nvSpPr>
-          <p:cNvPr id="139" name="Shape 139"/>
-          <p:cNvSpPr txBox="1">
-            <a:spLocks noGrp="1"/>
-          </p:cNvSpPr>
-          <p:nvPr>
-            <p:ph type="ctrTitle" idx="4294967295"/>
-          </p:nvPr>
-        </p:nvSpPr>
-        <p:spPr>
-          <a:xfrm>
-            <a:off x="2891850" y="1635838"/>
-            <a:ext cx="3282000" cy="1546500"/>
-          </a:xfrm>
-          <a:prstGeom prst="rect">
-            <a:avLst/>
-          </a:prstGeom>
-        </p:spPr>
-        <p:txBody>
-          <a:bodyPr spcFirstLastPara="1" wrap="square" lIns="91425" tIns="91425" rIns="91425" bIns="91425" anchor="b" anchorCtr="0">
-            <a:noAutofit/>
-          </a:bodyPr>
-          <a:lstStyle/>
-          <a:p>
-            <a:pPr marL="0" lvl="0" indent="0" rtl="0">
-              <a:spcBef>
-                <a:spcPts val="0"/>
-              </a:spcBef>
-              <a:spcAft>
-                <a:spcPts val="0"/>
-              </a:spcAft>
-              <a:buNone/>
-            </a:pPr>
-            <a:r>
-              <a:rPr lang="en" sz="6000" b="1"/>
-              <a:t>Thanks!</a:t>
-            </a:r>
-            <a:endParaRPr sz="6000" b="1"/>
-          </a:p>
-        </p:txBody>
-      </p:sp>
-      <p:sp>
-        <p:nvSpPr>
-          <p:cNvPr id="140" name="Shape 140"/>
-          <p:cNvSpPr txBox="1">
-            <a:spLocks noGrp="1"/>
-          </p:cNvSpPr>
-          <p:nvPr>
-            <p:ph type="subTitle" idx="4294967295"/>
-          </p:nvPr>
-        </p:nvSpPr>
-        <p:spPr>
-          <a:xfrm>
-            <a:off x="2891850" y="3235263"/>
-            <a:ext cx="3360300" cy="1046400"/>
-          </a:xfrm>
-          <a:prstGeom prst="rect">
-            <a:avLst/>
-          </a:prstGeom>
-        </p:spPr>
-        <p:txBody>
-          <a:bodyPr spcFirstLastPara="1" wrap="square" lIns="91425" tIns="91425" rIns="91425" bIns="91425" anchor="t" anchorCtr="0">
-            <a:noAutofit/>
-          </a:bodyPr>
-          <a:lstStyle/>
-          <a:p>
-            <a:pPr marL="0" lvl="0" indent="0" rtl="0">
-              <a:spcBef>
-                <a:spcPts val="600"/>
-              </a:spcBef>
-              <a:spcAft>
-                <a:spcPts val="0"/>
-              </a:spcAft>
-              <a:buNone/>
-            </a:pPr>
-            <a:r>
-              <a:rPr lang="en" sz="3600" b="1"/>
-              <a:t>Any questions?</a:t>
-            </a:r>
-            <a:endParaRPr sz="3600" b="1"/>
-          </a:p>
-        </p:txBody>
-      </p:sp>
-      <p:sp>
-        <p:nvSpPr>
-          <p:cNvPr id="141" name="Shape 141"/>
-          <p:cNvSpPr txBox="1">
-            <a:spLocks noGrp="1"/>
-          </p:cNvSpPr>
-          <p:nvPr>
-            <p:ph type="sldNum" idx="12"/>
-          </p:nvPr>
-        </p:nvSpPr>
-        <p:spPr>
-          <a:xfrm>
-            <a:off x="8404384" y="6333134"/>
-            <a:ext cx="548700" cy="525000"/>
-          </a:xfrm>
-          <a:prstGeom prst="rect">
-            <a:avLst/>
-          </a:prstGeom>
-        </p:spPr>
-        <p:txBody>
-          <a:bodyPr spcFirstLastPara="1" wrap="square" lIns="91425" tIns="91425" rIns="91425" bIns="91425" anchor="t" anchorCtr="0">
-            <a:noAutofit/>
-          </a:bodyPr>
-          <a:lstStyle/>
-          <a:p>
-            <a:pPr marL="0" lvl="0" indent="0" rtl="0">
-              <a:spcBef>
-                <a:spcPts val="0"/>
-              </a:spcBef>
-              <a:spcAft>
-                <a:spcPts val="0"/>
-              </a:spcAft>
-              <a:buNone/>
-            </a:pPr>
-            <a:fld id="{00000000-1234-1234-1234-123412341234}" type="slidenum">
-              <a:rPr lang="en"/>
-              <a:pPr marL="0" lvl="0" indent="0" rtl="0">
-                <a:spcBef>
-                  <a:spcPts val="0"/>
-                </a:spcBef>
-                <a:spcAft>
-                  <a:spcPts val="0"/>
-                </a:spcAft>
-                <a:buNone/>
-              </a:pPr>
-              <a:t>10</a:t>
-            </a:fld>
-            <a:endParaRPr/>
-          </a:p>
-        </p:txBody>
-      </p:sp>
-    </p:spTree>
-  </p:cSld>
-  <p:clrMapOvr>
-    <a:masterClrMapping/>
-  </p:clrMapOvr>
-</p:sld>
-</file>
-
 <file path=ppt/slides/slide2.xml><?xml version="1.0" encoding="utf-8"?>
 <p:sld xmlns:a="http://schemas.openxmlformats.org/drawingml/2006/main" xmlns:r="http://schemas.openxmlformats.org/officeDocument/2006/relationships" xmlns:p="http://schemas.openxmlformats.org/presentationml/2006/main">
   <p:cSld>
@@ -8703,7 +8390,7 @@
   <p:cSld>
     <p:spTree>
       <p:nvGrpSpPr>
-        <p:cNvPr id="1" name="Shape 117"/>
+        <p:cNvPr id="1" name="Shape 124"/>
         <p:cNvGrpSpPr/>
         <p:nvPr/>
       </p:nvGrpSpPr>
@@ -8717,7 +8404,7 @@
       </p:grpSpPr>
       <p:sp>
         <p:nvSpPr>
-          <p:cNvPr id="118" name="Shape 118"/>
+          <p:cNvPr id="125" name="Shape 125"/>
           <p:cNvSpPr txBox="1">
             <a:spLocks noGrp="1"/>
           </p:cNvSpPr>
@@ -8751,7 +8438,7 @@
             </a:pPr>
             <a:r>
               <a:rPr lang="en"/>
-              <a:t>Notes</a:t>
+              <a:t>Work done</a:t>
             </a:r>
             <a:endParaRPr/>
           </a:p>
@@ -8759,7 +8446,7 @@
       </p:sp>
       <p:sp>
         <p:nvSpPr>
-          <p:cNvPr id="119" name="Shape 119"/>
+          <p:cNvPr id="126" name="Shape 126"/>
           <p:cNvSpPr txBox="1">
             <a:spLocks noGrp="1"/>
           </p:cNvSpPr>
@@ -8782,138 +8469,21 @@
           </a:bodyPr>
           <a:lstStyle/>
           <a:p>
-            <a:pPr marL="457200" lvl="0" indent="-342900" rtl="0">
+            <a:pPr marL="457200" lvl="0" indent="-317500" algn="just" rtl="0">
               <a:spcBef>
                 <a:spcPts val="600"/>
               </a:spcBef>
               <a:spcAft>
                 <a:spcPts val="0"/>
               </a:spcAft>
-              <a:buSzPts val="1800"/>
+              <a:buSzPts val="1400"/>
               <a:buChar char="◎"/>
             </a:pPr>
             <a:r>
-              <a:rPr lang="en" sz="1800"/>
-              <a:t>Bugs found:</a:t>
+              <a:rPr lang="en" sz="1400"/>
+              <a:t>App entirely coded by Henri Keopraseuth, with the help of StackOverflow and others.</a:t>
             </a:r>
-            <a:endParaRPr sz="1800"/>
-          </a:p>
-          <a:p>
-            <a:pPr marL="914400" lvl="1" indent="-342900" rtl="0">
-              <a:spcBef>
-                <a:spcPts val="1000"/>
-              </a:spcBef>
-              <a:spcAft>
-                <a:spcPts val="0"/>
-              </a:spcAft>
-              <a:buSzPts val="1800"/>
-              <a:buChar char="○"/>
-            </a:pPr>
-            <a:r>
-              <a:rPr lang="en" sz="1800"/>
-              <a:t>In our tests, our GET request reached a maximum of 40 matches. The JSONObject will reach the maximum GET request size. </a:t>
-            </a:r>
-            <a:endParaRPr sz="1800"/>
-          </a:p>
-          <a:p>
-            <a:pPr marL="1371600" lvl="2" indent="-342900" rtl="0">
-              <a:spcBef>
-                <a:spcPts val="1000"/>
-              </a:spcBef>
-              <a:spcAft>
-                <a:spcPts val="0"/>
-              </a:spcAft>
-              <a:buSzPts val="1800"/>
-              <a:buChar char="◉"/>
-            </a:pPr>
-            <a:r>
-              <a:rPr lang="en" sz="1800"/>
-              <a:t>Possible causes :</a:t>
-            </a:r>
-            <a:endParaRPr sz="1800"/>
-          </a:p>
-          <a:p>
-            <a:pPr marL="1828800" lvl="3" indent="-342900" rtl="0">
-              <a:spcBef>
-                <a:spcPts val="1000"/>
-              </a:spcBef>
-              <a:spcAft>
-                <a:spcPts val="0"/>
-              </a:spcAft>
-              <a:buSzPts val="1800"/>
-              <a:buChar char="●"/>
-            </a:pPr>
-            <a:r>
-              <a:rPr lang="en" sz="1800"/>
-              <a:t>It’s up to MatchMore to increase this limit.</a:t>
-            </a:r>
-            <a:endParaRPr sz="1800"/>
-          </a:p>
-          <a:p>
-            <a:pPr marL="1828800" lvl="3" indent="-342900" rtl="0">
-              <a:spcBef>
-                <a:spcPts val="1000"/>
-              </a:spcBef>
-              <a:spcAft>
-                <a:spcPts val="0"/>
-              </a:spcAft>
-              <a:buSzPts val="1800"/>
-              <a:buChar char="●"/>
-            </a:pPr>
-            <a:r>
-              <a:rPr lang="en"/>
-              <a:t>Subscription duration was set to 0. It may not have found directly a match</a:t>
-            </a:r>
-            <a:r>
-              <a:rPr lang="en" sz="1800"/>
-              <a:t/>
-            </a:r>
-            <a:br>
-              <a:rPr lang="en" sz="1800"/>
-            </a:br>
-            <a:endParaRPr sz="1800"/>
-          </a:p>
-          <a:p>
-            <a:pPr marL="457200" lvl="0" indent="-342900" rtl="0">
-              <a:spcBef>
-                <a:spcPts val="1000"/>
-              </a:spcBef>
-              <a:spcAft>
-                <a:spcPts val="0"/>
-              </a:spcAft>
-              <a:buSzPts val="1800"/>
-              <a:buChar char="◎"/>
-            </a:pPr>
-            <a:r>
-              <a:rPr lang="en" sz="1800"/>
-              <a:t>Bug found in APK release (not when using the AVD):</a:t>
-            </a:r>
-            <a:endParaRPr sz="1800"/>
-          </a:p>
-          <a:p>
-            <a:pPr marL="914400" lvl="1" indent="-342900" rtl="0">
-              <a:spcBef>
-                <a:spcPts val="1000"/>
-              </a:spcBef>
-              <a:spcAft>
-                <a:spcPts val="0"/>
-              </a:spcAft>
-              <a:buSzPts val="1800"/>
-              <a:buChar char="○"/>
-            </a:pPr>
-            <a:r>
-              <a:rPr lang="en" sz="1800"/>
-              <a:t>When launching the app for the </a:t>
-            </a:r>
-            <a:r>
-              <a:rPr lang="en" sz="1800" b="1"/>
-              <a:t>first time</a:t>
-            </a:r>
-            <a:r>
-              <a:rPr lang="en" sz="1800"/>
-              <a:t>, the app will take some time to configure. The first match will take up to a minute to show up. The location for the first match will be at (0, 0) even if location has been activated for a minute.</a:t>
-            </a:r>
-            <a:endParaRPr sz="1800"/>
+            <a:endParaRPr sz="1400"/>
           </a:p>
           <a:p>
             <a:pPr marL="0" lvl="0" indent="0" rtl="0">
@@ -8931,7 +8501,7 @@
       </p:sp>
       <p:sp>
         <p:nvSpPr>
-          <p:cNvPr id="120" name="Shape 120"/>
+          <p:cNvPr id="127" name="Shape 127"/>
           <p:cNvSpPr txBox="1">
             <a:spLocks noGrp="1"/>
           </p:cNvSpPr>
@@ -8993,7 +8563,7 @@
   <p:cSld>
     <p:spTree>
       <p:nvGrpSpPr>
-        <p:cNvPr id="1" name="Shape 124"/>
+        <p:cNvPr id="1" name="Shape 131"/>
         <p:cNvGrpSpPr/>
         <p:nvPr/>
       </p:nvGrpSpPr>
@@ -9007,7 +8577,7 @@
       </p:grpSpPr>
       <p:sp>
         <p:nvSpPr>
-          <p:cNvPr id="125" name="Shape 125"/>
+          <p:cNvPr id="132" name="Shape 132"/>
           <p:cNvSpPr txBox="1">
             <a:spLocks noGrp="1"/>
           </p:cNvSpPr>
@@ -9041,7 +8611,7 @@
             </a:pPr>
             <a:r>
               <a:rPr lang="en"/>
-              <a:t>Work done</a:t>
+              <a:t>TO DO:</a:t>
             </a:r>
             <a:endParaRPr/>
           </a:p>
@@ -9049,7 +8619,7 @@
       </p:sp>
       <p:sp>
         <p:nvSpPr>
-          <p:cNvPr id="126" name="Shape 126"/>
+          <p:cNvPr id="133" name="Shape 133"/>
           <p:cNvSpPr txBox="1">
             <a:spLocks noGrp="1"/>
           </p:cNvSpPr>
@@ -9084,7 +8654,7 @@
             </a:pPr>
             <a:r>
               <a:rPr lang="en" sz="1400"/>
-              <a:t>App entirely coded by Henri Keopraseuth, with the help of StackOverflow and others.</a:t>
+              <a:t>Implement backend</a:t>
             </a:r>
             <a:endParaRPr sz="1400"/>
           </a:p>
@@ -9104,7 +8674,7 @@
       </p:sp>
       <p:sp>
         <p:nvSpPr>
-          <p:cNvPr id="127" name="Shape 127"/>
+          <p:cNvPr id="134" name="Shape 134"/>
           <p:cNvSpPr txBox="1">
             <a:spLocks noGrp="1"/>
           </p:cNvSpPr>
@@ -9166,7 +8736,7 @@
   <p:cSld>
     <p:spTree>
       <p:nvGrpSpPr>
-        <p:cNvPr id="1" name="Shape 131"/>
+        <p:cNvPr id="1" name="Shape 138"/>
         <p:cNvGrpSpPr/>
         <p:nvPr/>
       </p:nvGrpSpPr>
@@ -9180,18 +8750,18 @@
       </p:grpSpPr>
       <p:sp>
         <p:nvSpPr>
-          <p:cNvPr id="132" name="Shape 132"/>
+          <p:cNvPr id="139" name="Shape 139"/>
           <p:cNvSpPr txBox="1">
             <a:spLocks noGrp="1"/>
           </p:cNvSpPr>
           <p:nvPr>
-            <p:ph type="title"/>
+            <p:ph type="ctrTitle" idx="4294967295"/>
           </p:nvPr>
         </p:nvSpPr>
         <p:spPr>
           <a:xfrm>
-            <a:off x="786150" y="410826"/>
-            <a:ext cx="7571700" cy="936900"/>
+            <a:off x="2891850" y="1635838"/>
+            <a:ext cx="3282000" cy="1546500"/>
           </a:xfrm>
           <a:prstGeom prst="rect">
             <a:avLst/>
@@ -9213,27 +8783,27 @@
               <a:buNone/>
             </a:pPr>
             <a:r>
-              <a:rPr lang="en"/>
-              <a:t>TO DO:</a:t>
+              <a:rPr lang="en" sz="6000" b="1"/>
+              <a:t>Thanks!</a:t>
             </a:r>
-            <a:endParaRPr/>
+            <a:endParaRPr sz="6000" b="1"/>
           </a:p>
         </p:txBody>
       </p:sp>
       <p:sp>
         <p:nvSpPr>
-          <p:cNvPr id="133" name="Shape 133"/>
+          <p:cNvPr id="140" name="Shape 140"/>
           <p:cNvSpPr txBox="1">
             <a:spLocks noGrp="1"/>
           </p:cNvSpPr>
           <p:nvPr>
-            <p:ph type="body" idx="1"/>
+            <p:ph type="subTitle" idx="4294967295"/>
           </p:nvPr>
         </p:nvSpPr>
         <p:spPr>
           <a:xfrm>
-            <a:off x="786150" y="1682267"/>
-            <a:ext cx="7571700" cy="4764900"/>
+            <a:off x="2891850" y="3235263"/>
+            <a:ext cx="3360300" cy="1046400"/>
           </a:xfrm>
           <a:prstGeom prst="rect">
             <a:avLst/>
@@ -9245,39 +8815,26 @@
           </a:bodyPr>
           <a:lstStyle/>
           <a:p>
-            <a:pPr marL="457200" lvl="0" indent="-317500" algn="just" rtl="0">
+            <a:pPr marL="0" lvl="0" indent="0" rtl="0">
               <a:spcBef>
                 <a:spcPts val="600"/>
               </a:spcBef>
               <a:spcAft>
                 <a:spcPts val="0"/>
               </a:spcAft>
-              <a:buSzPts val="1400"/>
-              <a:buChar char="◎"/>
+              <a:buNone/>
             </a:pPr>
             <a:r>
-              <a:rPr lang="en" sz="1400"/>
-              <a:t>Implement backend</a:t>
+              <a:rPr lang="en" sz="3600" b="1"/>
+              <a:t>Any questions?</a:t>
             </a:r>
-            <a:endParaRPr sz="1400"/>
-          </a:p>
-          <a:p>
-            <a:pPr marL="0" lvl="0" indent="0" rtl="0">
-              <a:spcBef>
-                <a:spcPts val="1000"/>
-              </a:spcBef>
-              <a:spcAft>
-                <a:spcPts val="0"/>
-              </a:spcAft>
-              <a:buNone/>
-            </a:pPr>
-            <a:endParaRPr/>
+            <a:endParaRPr sz="3600" b="1"/>
           </a:p>
         </p:txBody>
       </p:sp>
       <p:sp>
         <p:nvSpPr>
-          <p:cNvPr id="134" name="Shape 134"/>
+          <p:cNvPr id="141" name="Shape 141"/>
           <p:cNvSpPr txBox="1">
             <a:spLocks noGrp="1"/>
           </p:cNvSpPr>

</xml_diff>